<commit_message>
links.md added and powerpoint updated.
</commit_message>
<xml_diff>
--- a/Git & Github_ An Introduction to Version Control.pptx
+++ b/Git & Github_ An Introduction to Version Control.pptx
@@ -1472,7 +1472,7 @@
         </p:nvSpPr>
         <p:spPr>
           <a:xfrm>
-            <a:off x="381300" y="685800"/>
+            <a:off x="381000" y="685800"/>
             <a:ext cx="6096000" cy="3429000"/>
           </a:xfrm>
           <a:custGeom>
@@ -11397,7 +11397,68 @@
               <a:buChar char="●"/>
             </a:pPr>
             <a:r>
-              <a:rPr lang="en" sz="1600" dirty="0">
+              <a:rPr lang="en-US" sz="1600" dirty="0">
+                <a:solidFill>
+                  <a:schemeClr val="dk1"/>
+                </a:solidFill>
+                <a:latin typeface="Avenir"/>
+                <a:ea typeface="Avenir"/>
+                <a:cs typeface="Avenir"/>
+                <a:sym typeface="Avenir"/>
+              </a:rPr>
+              <a:t>GitHub Cheat Sheet</a:t>
+            </a:r>
+          </a:p>
+          <a:p>
+            <a:pPr marL="914400" lvl="1" indent="-330200" algn="l" rtl="0">
+              <a:lnSpc>
+                <a:spcPct val="115000"/>
+              </a:lnSpc>
+              <a:spcBef>
+                <a:spcPts val="0"/>
+              </a:spcBef>
+              <a:spcAft>
+                <a:spcPts val="0"/>
+              </a:spcAft>
+              <a:buClr>
+                <a:schemeClr val="dk1"/>
+              </a:buClr>
+              <a:buSzPts val="1600"/>
+              <a:buFont typeface="Avenir"/>
+              <a:buChar char="○"/>
+            </a:pPr>
+            <a:r>
+              <a:rPr lang="en-US" sz="1600" u="sng" dirty="0">
+                <a:solidFill>
+                  <a:schemeClr val="hlink"/>
+                </a:solidFill>
+                <a:hlinkClick r:id="rId4"/>
+              </a:rPr>
+              <a:t>https://training.github.com/downloads/github-git-cheat-sheet.pdf</a:t>
+            </a:r>
+            <a:endParaRPr lang="en-US" sz="1600" u="sng" dirty="0">
+              <a:solidFill>
+                <a:schemeClr val="hlink"/>
+              </a:solidFill>
+            </a:endParaRPr>
+          </a:p>
+          <a:p>
+            <a:pPr marL="457200" lvl="0" indent="-330200" algn="l" rtl="0">
+              <a:spcBef>
+                <a:spcPts val="0"/>
+              </a:spcBef>
+              <a:spcAft>
+                <a:spcPts val="0"/>
+              </a:spcAft>
+              <a:buClr>
+                <a:schemeClr val="dk1"/>
+              </a:buClr>
+              <a:buSzPts val="1600"/>
+              <a:buFont typeface="Avenir"/>
+              <a:buChar char="●"/>
+            </a:pPr>
+            <a:r>
+              <a:rPr lang="en-US" sz="1600" dirty="0">
                 <a:solidFill>
                   <a:schemeClr val="dk1"/>
                 </a:solidFill>
@@ -11408,15 +11469,6 @@
               </a:rPr>
               <a:t>Software Carpentry Git Novice workshop</a:t>
             </a:r>
-            <a:endParaRPr sz="1600" dirty="0">
-              <a:solidFill>
-                <a:schemeClr val="dk1"/>
-              </a:solidFill>
-              <a:latin typeface="Avenir"/>
-              <a:ea typeface="Avenir"/>
-              <a:cs typeface="Avenir"/>
-              <a:sym typeface="Avenir"/>
-            </a:endParaRPr>
           </a:p>
           <a:p>
             <a:pPr marL="914400" lvl="1" indent="-330200" algn="l" rtl="0">
@@ -11437,15 +11489,19 @@
               <a:buChar char="○"/>
             </a:pPr>
             <a:r>
-              <a:rPr lang="en" sz="1600" u="sng" dirty="0">
+              <a:rPr lang="en-US" sz="1600" u="sng" dirty="0">
                 <a:solidFill>
                   <a:schemeClr val="hlink"/>
                 </a:solidFill>
-                <a:hlinkClick r:id="rId4"/>
+                <a:hlinkClick r:id="rId5"/>
               </a:rPr>
               <a:t>https://swcarpentry.github.io/git-novice/</a:t>
             </a:r>
-            <a:endParaRPr sz="1600" u="sng" dirty="0"/>
+            <a:endParaRPr lang="en-US" sz="1600" u="sng" dirty="0">
+              <a:solidFill>
+                <a:schemeClr val="hlink"/>
+              </a:solidFill>
+            </a:endParaRPr>
           </a:p>
           <a:p>
             <a:pPr marL="457200" lvl="0" indent="-330200" algn="l" rtl="0">
@@ -11463,7 +11519,7 @@
               <a:buChar char="●"/>
             </a:pPr>
             <a:r>
-              <a:rPr lang="en" sz="1600" dirty="0">
+              <a:rPr lang="en-US" sz="1600" dirty="0">
                 <a:solidFill>
                   <a:schemeClr val="dk1"/>
                 </a:solidFill>
@@ -11472,17 +11528,8 @@
                 <a:cs typeface="Avenir"/>
                 <a:sym typeface="Avenir"/>
               </a:rPr>
-              <a:t>GitHub Cheat Sheet</a:t>
+              <a:t>Yale Research Computing Git Workshop Video Recording</a:t>
             </a:r>
-            <a:endParaRPr sz="1600" dirty="0">
-              <a:solidFill>
-                <a:schemeClr val="dk1"/>
-              </a:solidFill>
-              <a:latin typeface="Avenir"/>
-              <a:ea typeface="Avenir"/>
-              <a:cs typeface="Avenir"/>
-              <a:sym typeface="Avenir"/>
-            </a:endParaRPr>
           </a:p>
           <a:p>
             <a:pPr marL="914400" lvl="1" indent="-330200" algn="l" rtl="0">
@@ -11503,15 +11550,15 @@
               <a:buChar char="○"/>
             </a:pPr>
             <a:r>
-              <a:rPr lang="en" sz="1600" u="sng" dirty="0">
+              <a:rPr lang="en-US" sz="1600" u="sng" dirty="0">
                 <a:solidFill>
                   <a:schemeClr val="hlink"/>
                 </a:solidFill>
-                <a:hlinkClick r:id="rId5"/>
+                <a:hlinkClick r:id="rId6"/>
               </a:rPr>
-              <a:t>https://training.github.com/downloads/github-git-cheat-sheet.pdf</a:t>
+              <a:t>https://research.computing.yale.edu/training/version-control-git</a:t>
             </a:r>
-            <a:endParaRPr sz="1600" u="sng" dirty="0"/>
+            <a:endParaRPr lang="en-US" sz="1600" u="sng" dirty="0"/>
           </a:p>
           <a:p>
             <a:pPr marL="457200" lvl="0" indent="-330200" algn="l" rtl="0">
@@ -11570,7 +11617,7 @@
                 <a:solidFill>
                   <a:schemeClr val="hlink"/>
                 </a:solidFill>
-                <a:hlinkClick r:id="rId6"/>
+                <a:hlinkClick r:id="rId7"/>
               </a:rPr>
               <a:t>https://open-source-for-researchers.github.io/open-source-workshop/</a:t>
             </a:r>
@@ -11583,72 +11630,6 @@
               <a:cs typeface="Avenir"/>
               <a:sym typeface="Avenir"/>
             </a:endParaRPr>
-          </a:p>
-          <a:p>
-            <a:pPr marL="457200" lvl="0" indent="-330200" algn="l" rtl="0">
-              <a:spcBef>
-                <a:spcPts val="0"/>
-              </a:spcBef>
-              <a:spcAft>
-                <a:spcPts val="0"/>
-              </a:spcAft>
-              <a:buClr>
-                <a:schemeClr val="dk1"/>
-              </a:buClr>
-              <a:buSzPts val="1600"/>
-              <a:buFont typeface="Avenir"/>
-              <a:buChar char="●"/>
-            </a:pPr>
-            <a:r>
-              <a:rPr lang="en" sz="1600" dirty="0">
-                <a:solidFill>
-                  <a:schemeClr val="dk1"/>
-                </a:solidFill>
-                <a:latin typeface="Avenir"/>
-                <a:ea typeface="Avenir"/>
-                <a:cs typeface="Avenir"/>
-                <a:sym typeface="Avenir"/>
-              </a:rPr>
-              <a:t>Yale Research Computing Git Workshop Video Recording</a:t>
-            </a:r>
-            <a:endParaRPr sz="1600" dirty="0">
-              <a:solidFill>
-                <a:schemeClr val="dk1"/>
-              </a:solidFill>
-              <a:latin typeface="Avenir"/>
-              <a:ea typeface="Avenir"/>
-              <a:cs typeface="Avenir"/>
-              <a:sym typeface="Avenir"/>
-            </a:endParaRPr>
-          </a:p>
-          <a:p>
-            <a:pPr marL="914400" lvl="1" indent="-330200" algn="l" rtl="0">
-              <a:lnSpc>
-                <a:spcPct val="115000"/>
-              </a:lnSpc>
-              <a:spcBef>
-                <a:spcPts val="0"/>
-              </a:spcBef>
-              <a:spcAft>
-                <a:spcPts val="0"/>
-              </a:spcAft>
-              <a:buClr>
-                <a:schemeClr val="dk1"/>
-              </a:buClr>
-              <a:buSzPts val="1600"/>
-              <a:buFont typeface="Avenir"/>
-              <a:buChar char="○"/>
-            </a:pPr>
-            <a:r>
-              <a:rPr lang="en" sz="1600" u="sng" dirty="0">
-                <a:solidFill>
-                  <a:schemeClr val="hlink"/>
-                </a:solidFill>
-                <a:hlinkClick r:id="rId7"/>
-              </a:rPr>
-              <a:t>https://research.computing.yale.edu/training/version-control-git</a:t>
-            </a:r>
-            <a:endParaRPr sz="1600" b="1" u="sng" dirty="0"/>
           </a:p>
           <a:p>
             <a:pPr marL="914400" lvl="0" indent="0" algn="l" rtl="0">

</xml_diff>

<commit_message>
added qr code for survey
</commit_message>
<xml_diff>
--- a/Git & Github_ An Introduction to Version Control.pptx
+++ b/Git & Github_ An Introduction to Version Control.pptx
@@ -31,6 +31,11 @@
       <p:font typeface="Avenir" panose="02000503020000020003" pitchFamily="2" charset="0"/>
       <p:regular r:id="rId18"/>
       <p:italic r:id="rId19"/>
+    </p:embeddedFont>
+    <p:embeddedFont>
+      <p:font typeface="Avenir Book" panose="02000503020000020003" pitchFamily="2" charset="0"/>
+      <p:regular r:id="rId20"/>
+      <p:italic r:id="rId21"/>
     </p:embeddedFont>
   </p:embeddedFontLst>
   <p:defaultTextStyle>
@@ -1675,7 +1680,7 @@
         </p:nvSpPr>
         <p:spPr>
           <a:xfrm>
-            <a:off x="381300" y="685800"/>
+            <a:off x="381000" y="685800"/>
             <a:ext cx="6096000" cy="3429000"/>
           </a:xfrm>
           <a:custGeom>
@@ -12251,8 +12256,8 @@
         </p:nvSpPr>
         <p:spPr>
           <a:xfrm>
-            <a:off x="2630425" y="299627"/>
-            <a:ext cx="5445900" cy="2146200"/>
+            <a:off x="2630425" y="277342"/>
+            <a:ext cx="5445900" cy="1329785"/>
           </a:xfrm>
           <a:prstGeom prst="rect">
             <a:avLst/>
@@ -12274,10 +12279,10 @@
               <a:buNone/>
             </a:pPr>
             <a:r>
-              <a:rPr lang="en" sz="3600"/>
+              <a:rPr lang="en" sz="3600" dirty="0"/>
               <a:t>Take the class Survey!</a:t>
             </a:r>
-            <a:endParaRPr sz="3600"/>
+            <a:endParaRPr sz="3600" dirty="0"/>
           </a:p>
         </p:txBody>
       </p:sp>
@@ -12293,8 +12298,8 @@
         </p:nvSpPr>
         <p:spPr>
           <a:xfrm>
-            <a:off x="2630325" y="2445925"/>
-            <a:ext cx="5445900" cy="1217100"/>
+            <a:off x="2630425" y="2039852"/>
+            <a:ext cx="5445900" cy="531898"/>
           </a:xfrm>
           <a:prstGeom prst="rect">
             <a:avLst/>
@@ -12315,7 +12320,11 @@
               </a:spcAft>
               <a:buNone/>
             </a:pPr>
-            <a:endParaRPr sz="1600"/>
+            <a:endParaRPr sz="1600" dirty="0">
+              <a:solidFill>
+                <a:schemeClr val="tx1"/>
+              </a:solidFill>
+            </a:endParaRPr>
           </a:p>
           <a:p>
             <a:pPr marL="0" lvl="0" indent="0" algn="r" rtl="0">
@@ -12327,7 +12336,11 @@
               </a:spcAft>
               <a:buNone/>
             </a:pPr>
-            <a:endParaRPr sz="2100" b="1"/>
+            <a:endParaRPr sz="2100" b="1" dirty="0">
+              <a:solidFill>
+                <a:schemeClr val="tx1"/>
+              </a:solidFill>
+            </a:endParaRPr>
           </a:p>
           <a:p>
             <a:pPr marL="0" lvl="0" indent="0" algn="r" rtl="0">
@@ -12340,10 +12353,18 @@
               <a:buNone/>
             </a:pPr>
             <a:r>
-              <a:rPr lang="en" sz="2100" b="1"/>
+              <a:rPr lang="en" sz="2100" b="1" dirty="0">
+                <a:solidFill>
+                  <a:schemeClr val="tx1"/>
+                </a:solidFill>
+              </a:rPr>
               <a:t>It’s only 4 questions!</a:t>
             </a:r>
-            <a:endParaRPr sz="2100" b="1"/>
+            <a:endParaRPr sz="2100" b="1" dirty="0">
+              <a:solidFill>
+                <a:schemeClr val="tx1"/>
+              </a:solidFill>
+            </a:endParaRPr>
           </a:p>
           <a:p>
             <a:pPr marL="0" lvl="0" indent="0" algn="r" rtl="0">
@@ -12356,10 +12377,42 @@
               <a:buNone/>
             </a:pPr>
             <a:r>
-              <a:rPr lang="en" sz="2600" b="1"/>
-              <a:t>https://tinyurl.com/gitintrosurvey</a:t>
-            </a:r>
-            <a:endParaRPr sz="2600" b="1"/>
+              <a:rPr lang="en" sz="2600" b="1" dirty="0">
+                <a:solidFill>
+                  <a:schemeClr val="tx1"/>
+                </a:solidFill>
+              </a:rPr>
+              <a:t>https://</a:t>
+            </a:r>
+            <a:r>
+              <a:rPr lang="en" sz="2600" b="1" dirty="0" err="1">
+                <a:solidFill>
+                  <a:schemeClr val="tx1"/>
+                </a:solidFill>
+              </a:rPr>
+              <a:t>tinyurl.com</a:t>
+            </a:r>
+            <a:r>
+              <a:rPr lang="en" sz="2600" b="1" dirty="0">
+                <a:solidFill>
+                  <a:schemeClr val="tx1"/>
+                </a:solidFill>
+              </a:rPr>
+              <a:t>/</a:t>
+            </a:r>
+            <a:r>
+              <a:rPr lang="en" sz="2600" b="1" dirty="0" err="1">
+                <a:solidFill>
+                  <a:schemeClr val="tx1"/>
+                </a:solidFill>
+              </a:rPr>
+              <a:t>gitintrosurvey</a:t>
+            </a:r>
+            <a:endParaRPr sz="2600" b="1" dirty="0">
+              <a:solidFill>
+                <a:schemeClr val="tx1"/>
+              </a:solidFill>
+            </a:endParaRPr>
           </a:p>
         </p:txBody>
       </p:sp>
@@ -12406,6 +12459,76 @@
               <a:cs typeface="Avenir"/>
               <a:sym typeface="Avenir"/>
             </a:endParaRPr>
+          </a:p>
+        </p:txBody>
+      </p:sp>
+      <p:pic>
+        <p:nvPicPr>
+          <p:cNvPr id="3" name="Picture 2" descr="A qr code on a white background&#10;&#10;Description automatically generated">
+            <a:extLst>
+              <a:ext uri="{FF2B5EF4-FFF2-40B4-BE49-F238E27FC236}">
+                <a16:creationId xmlns:a16="http://schemas.microsoft.com/office/drawing/2014/main" id="{9B1F3A60-FB57-085C-DF37-2210F061AC49}"/>
+              </a:ext>
+            </a:extLst>
+          </p:cNvPr>
+          <p:cNvPicPr>
+            <a:picLocks noChangeAspect="1"/>
+          </p:cNvPicPr>
+          <p:nvPr/>
+        </p:nvPicPr>
+        <p:blipFill>
+          <a:blip r:embed="rId3"/>
+          <a:stretch>
+            <a:fillRect/>
+          </a:stretch>
+        </p:blipFill>
+        <p:spPr>
+          <a:xfrm>
+            <a:off x="3755201" y="2756177"/>
+            <a:ext cx="1633597" cy="1586923"/>
+          </a:xfrm>
+          <a:prstGeom prst="rect">
+            <a:avLst/>
+          </a:prstGeom>
+        </p:spPr>
+      </p:pic>
+      <p:sp>
+        <p:nvSpPr>
+          <p:cNvPr id="4" name="TextBox 3">
+            <a:extLst>
+              <a:ext uri="{FF2B5EF4-FFF2-40B4-BE49-F238E27FC236}">
+                <a16:creationId xmlns:a16="http://schemas.microsoft.com/office/drawing/2014/main" id="{F46FE9F3-06FF-B41E-6689-22B255BD006C}"/>
+              </a:ext>
+            </a:extLst>
+          </p:cNvPr>
+          <p:cNvSpPr txBox="1"/>
+          <p:nvPr/>
+        </p:nvSpPr>
+        <p:spPr>
+          <a:xfrm>
+            <a:off x="5708073" y="3006436"/>
+            <a:ext cx="2590800" cy="954107"/>
+          </a:xfrm>
+          <a:prstGeom prst="rect">
+            <a:avLst/>
+          </a:prstGeom>
+          <a:noFill/>
+        </p:spPr>
+        <p:txBody>
+          <a:bodyPr wrap="square" rtlCol="0">
+            <a:spAutoFit/>
+          </a:bodyPr>
+          <a:lstStyle/>
+          <a:p>
+            <a:r>
+              <a:rPr lang="en-US" sz="2800" b="1" dirty="0">
+                <a:solidFill>
+                  <a:schemeClr val="tx1"/>
+                </a:solidFill>
+                <a:latin typeface="Avenir Book" panose="02000503020000020003" pitchFamily="2" charset="0"/>
+              </a:rPr>
+              <a:t>Scan for survey!</a:t>
+            </a:r>
           </a:p>
         </p:txBody>
       </p:sp>

</xml_diff>